<commit_message>
more power point beautification
</commit_message>
<xml_diff>
--- a/J2_Forum.pptx
+++ b/J2_Forum.pptx
@@ -3450,10 +3450,10 @@
           <p:nvPr/>
         </p:nvPicPr>
         <p:blipFill>
-          <a:blip r:embed="rId2">
+          <a:blip r:embed="rId2" cstate="print">
             <a:extLst>
               <a:ext uri="{28A0092B-C50C-407E-A947-70E740481C1C}">
-                <a14:useLocalDpi xmlns:a14="http://schemas.microsoft.com/office/drawing/2010/main" val="0"/>
+                <a14:useLocalDpi xmlns:a14="http://schemas.microsoft.com/office/drawing/2010/main" xmlns="" val="0"/>
               </a:ext>
             </a:extLst>
           </a:blip>
@@ -3501,11 +3501,7 @@
           <a:p>
             <a:r>
               <a:rPr lang="en-US" sz="3200" dirty="0" smtClean="0"/>
-              <a:t>Jason </a:t>
-            </a:r>
-            <a:r>
-              <a:rPr lang="en-US" sz="3200" dirty="0" smtClean="0"/>
-              <a:t>Campbell</a:t>
+              <a:t>Jason Campbell</a:t>
             </a:r>
           </a:p>
           <a:p>
@@ -3595,45 +3591,104 @@
           <a:bodyPr/>
           <a:lstStyle/>
           <a:p>
+            <a:pPr>
+              <a:lnSpc>
+                <a:spcPct val="150000"/>
+              </a:lnSpc>
+            </a:pPr>
             <a:r>
               <a:rPr lang="en-US" dirty="0" smtClean="0"/>
               <a:t>Why we chose the project</a:t>
             </a:r>
           </a:p>
           <a:p>
-            <a:r>
-              <a:rPr lang="en-US" dirty="0" smtClean="0"/>
-              <a:t>Forum overview</a:t>
-            </a:r>
-          </a:p>
-          <a:p>
-            <a:r>
-              <a:rPr lang="en-US" dirty="0" smtClean="0"/>
-              <a:t>User interaction with the forum</a:t>
-            </a:r>
-          </a:p>
-          <a:p>
-            <a:r>
-              <a:rPr lang="en-US" dirty="0" smtClean="0"/>
-              <a:t>How we communicated during the design</a:t>
-            </a:r>
-          </a:p>
-          <a:p>
-            <a:r>
-              <a:rPr lang="en-US" dirty="0" smtClean="0"/>
-              <a:t>Problems encountered/solved</a:t>
-            </a:r>
-          </a:p>
-          <a:p>
-            <a:r>
-              <a:rPr lang="en-US" dirty="0" smtClean="0"/>
-              <a:t>Future expansion?</a:t>
-            </a:r>
-          </a:p>
-          <a:p>
-            <a:r>
-              <a:rPr lang="en-US" dirty="0" smtClean="0"/>
-              <a:t>Demo of the forum</a:t>
+            <a:pPr>
+              <a:lnSpc>
+                <a:spcPct val="150000"/>
+              </a:lnSpc>
+            </a:pPr>
+            <a:r>
+              <a:rPr lang="en-US" dirty="0" smtClean="0"/>
+              <a:t>Forum </a:t>
+            </a:r>
+            <a:r>
+              <a:rPr lang="en-US" dirty="0" smtClean="0"/>
+              <a:t>overview</a:t>
+            </a:r>
+          </a:p>
+          <a:p>
+            <a:pPr>
+              <a:lnSpc>
+                <a:spcPct val="150000"/>
+              </a:lnSpc>
+            </a:pPr>
+            <a:r>
+              <a:rPr lang="en-US" dirty="0" smtClean="0"/>
+              <a:t>User </a:t>
+            </a:r>
+            <a:r>
+              <a:rPr lang="en-US" dirty="0" smtClean="0"/>
+              <a:t>interaction with the forum</a:t>
+            </a:r>
+          </a:p>
+          <a:p>
+            <a:pPr>
+              <a:lnSpc>
+                <a:spcPct val="150000"/>
+              </a:lnSpc>
+            </a:pPr>
+            <a:r>
+              <a:rPr lang="en-US" dirty="0" smtClean="0"/>
+              <a:t>How </a:t>
+            </a:r>
+            <a:r>
+              <a:rPr lang="en-US" dirty="0" smtClean="0"/>
+              <a:t>we communicated during the design</a:t>
+            </a:r>
+          </a:p>
+          <a:p>
+            <a:pPr>
+              <a:lnSpc>
+                <a:spcPct val="150000"/>
+              </a:lnSpc>
+            </a:pPr>
+            <a:r>
+              <a:rPr lang="en-US" dirty="0" smtClean="0"/>
+              <a:t>Problems </a:t>
+            </a:r>
+            <a:r>
+              <a:rPr lang="en-US" dirty="0" smtClean="0"/>
+              <a:t>encountered/solved</a:t>
+            </a:r>
+          </a:p>
+          <a:p>
+            <a:pPr>
+              <a:lnSpc>
+                <a:spcPct val="150000"/>
+              </a:lnSpc>
+            </a:pPr>
+            <a:r>
+              <a:rPr lang="en-US" dirty="0" smtClean="0"/>
+              <a:t>Future </a:t>
+            </a:r>
+            <a:r>
+              <a:rPr lang="en-US" dirty="0" smtClean="0"/>
+              <a:t>expansion?</a:t>
+            </a:r>
+          </a:p>
+          <a:p>
+            <a:pPr>
+              <a:lnSpc>
+                <a:spcPct val="150000"/>
+              </a:lnSpc>
+            </a:pPr>
+            <a:r>
+              <a:rPr lang="en-US" dirty="0" smtClean="0"/>
+              <a:t>Demo </a:t>
+            </a:r>
+            <a:r>
+              <a:rPr lang="en-US" dirty="0" smtClean="0"/>
+              <a:t>of the forum</a:t>
             </a:r>
             <a:endParaRPr lang="en-US" dirty="0"/>
           </a:p>
@@ -3709,47 +3764,77 @@
           <a:bodyPr/>
           <a:lstStyle/>
           <a:p>
+            <a:pPr>
+              <a:lnSpc>
+                <a:spcPct val="150000"/>
+              </a:lnSpc>
+            </a:pPr>
             <a:r>
               <a:rPr lang="en-US" dirty="0" smtClean="0"/>
               <a:t>Project idea chosen by Jin</a:t>
             </a:r>
           </a:p>
           <a:p>
-            <a:pPr lvl="1"/>
+            <a:pPr lvl="1">
+              <a:lnSpc>
+                <a:spcPct val="150000"/>
+              </a:lnSpc>
+            </a:pPr>
             <a:r>
               <a:rPr lang="en-US" dirty="0" smtClean="0"/>
               <a:t>Web 2.0 – user created content is the trend</a:t>
             </a:r>
           </a:p>
           <a:p>
-            <a:pPr lvl="1"/>
+            <a:pPr lvl="1">
+              <a:lnSpc>
+                <a:spcPct val="150000"/>
+              </a:lnSpc>
+            </a:pPr>
             <a:r>
               <a:rPr lang="en-US" dirty="0" smtClean="0"/>
               <a:t>Liked idea of open discussion topics</a:t>
             </a:r>
           </a:p>
           <a:p>
+            <a:pPr>
+              <a:lnSpc>
+                <a:spcPct val="150000"/>
+              </a:lnSpc>
+            </a:pPr>
             <a:r>
               <a:rPr lang="en-US" dirty="0" smtClean="0"/>
               <a:t>Potential for business concept:</a:t>
             </a:r>
           </a:p>
           <a:p>
-            <a:pPr lvl="1"/>
+            <a:pPr lvl="1">
+              <a:lnSpc>
+                <a:spcPct val="150000"/>
+              </a:lnSpc>
+            </a:pPr>
             <a:r>
               <a:rPr lang="en-US" dirty="0" smtClean="0"/>
               <a:t>Advertising</a:t>
             </a:r>
           </a:p>
           <a:p>
-            <a:pPr lvl="1"/>
+            <a:pPr lvl="1">
+              <a:lnSpc>
+                <a:spcPct val="150000"/>
+              </a:lnSpc>
+            </a:pPr>
             <a:r>
               <a:rPr lang="en-US" dirty="0" smtClean="0"/>
               <a:t>Email subscriptions</a:t>
             </a:r>
           </a:p>
           <a:p>
-            <a:pPr lvl="1"/>
+            <a:pPr lvl="1">
+              <a:lnSpc>
+                <a:spcPct val="150000"/>
+              </a:lnSpc>
+            </a:pPr>
             <a:r>
               <a:rPr lang="en-US" dirty="0" smtClean="0"/>
               <a:t>Etc.</a:t>
@@ -3825,69 +3910,114 @@
         <p:spPr/>
         <p:txBody>
           <a:bodyPr>
-            <a:normAutofit/>
+            <a:normAutofit fontScale="85000" lnSpcReduction="20000"/>
           </a:bodyPr>
           <a:lstStyle/>
           <a:p>
+            <a:pPr>
+              <a:lnSpc>
+                <a:spcPct val="150000"/>
+              </a:lnSpc>
+            </a:pPr>
             <a:r>
               <a:rPr lang="en-US" dirty="0" smtClean="0"/>
               <a:t>Forum</a:t>
             </a:r>
           </a:p>
           <a:p>
-            <a:pPr lvl="1"/>
+            <a:pPr lvl="1">
+              <a:lnSpc>
+                <a:spcPct val="150000"/>
+              </a:lnSpc>
+            </a:pPr>
             <a:r>
               <a:rPr lang="en-US" dirty="0" smtClean="0"/>
               <a:t>User accounts – login/logout</a:t>
             </a:r>
           </a:p>
           <a:p>
-            <a:pPr lvl="1"/>
+            <a:pPr lvl="1">
+              <a:lnSpc>
+                <a:spcPct val="150000"/>
+              </a:lnSpc>
+            </a:pPr>
             <a:r>
               <a:rPr lang="en-US" dirty="0" smtClean="0"/>
               <a:t>View and reply to threads</a:t>
             </a:r>
           </a:p>
           <a:p>
-            <a:pPr lvl="1"/>
+            <a:pPr lvl="1">
+              <a:lnSpc>
+                <a:spcPct val="150000"/>
+              </a:lnSpc>
+            </a:pPr>
             <a:r>
               <a:rPr lang="en-US" dirty="0" smtClean="0"/>
               <a:t>Start new threads</a:t>
             </a:r>
           </a:p>
           <a:p>
+            <a:pPr>
+              <a:lnSpc>
+                <a:spcPct val="150000"/>
+              </a:lnSpc>
+            </a:pPr>
             <a:r>
               <a:rPr lang="en-US" dirty="0" smtClean="0"/>
               <a:t>First Time User Registration</a:t>
             </a:r>
           </a:p>
           <a:p>
+            <a:pPr>
+              <a:lnSpc>
+                <a:spcPct val="150000"/>
+              </a:lnSpc>
+            </a:pPr>
             <a:r>
               <a:rPr lang="en-US" dirty="0" smtClean="0"/>
               <a:t>User Control Panel</a:t>
             </a:r>
           </a:p>
           <a:p>
-            <a:pPr lvl="1"/>
+            <a:pPr lvl="1">
+              <a:lnSpc>
+                <a:spcPct val="150000"/>
+              </a:lnSpc>
+            </a:pPr>
             <a:r>
               <a:rPr lang="en-US" dirty="0" smtClean="0"/>
               <a:t>User info, email address, statistics</a:t>
             </a:r>
           </a:p>
           <a:p>
-            <a:pPr lvl="1"/>
+            <a:pPr lvl="1">
+              <a:lnSpc>
+                <a:spcPct val="150000"/>
+              </a:lnSpc>
+            </a:pPr>
             <a:r>
               <a:rPr lang="en-US" dirty="0" smtClean="0"/>
               <a:t>Change password and email address</a:t>
             </a:r>
           </a:p>
           <a:p>
+            <a:pPr>
+              <a:lnSpc>
+                <a:spcPct val="150000"/>
+              </a:lnSpc>
+            </a:pPr>
             <a:r>
               <a:rPr lang="en-US" dirty="0" smtClean="0"/>
               <a:t>About Us</a:t>
             </a:r>
           </a:p>
           <a:p>
+            <a:pPr>
+              <a:lnSpc>
+                <a:spcPct val="150000"/>
+              </a:lnSpc>
+            </a:pPr>
             <a:r>
               <a:rPr lang="en-US" dirty="0" smtClean="0"/>
               <a:t>Help</a:t>
@@ -3964,23 +4094,37 @@
         <p:spPr/>
         <p:txBody>
           <a:bodyPr>
-            <a:normAutofit/>
+            <a:normAutofit lnSpcReduction="10000"/>
           </a:bodyPr>
           <a:lstStyle/>
           <a:p>
+            <a:pPr>
+              <a:lnSpc>
+                <a:spcPct val="150000"/>
+              </a:lnSpc>
+            </a:pPr>
             <a:r>
               <a:rPr lang="en-US" dirty="0" smtClean="0"/>
               <a:t>Typical forum actions</a:t>
             </a:r>
           </a:p>
           <a:p>
-            <a:pPr lvl="1"/>
+            <a:pPr lvl="1">
+              <a:lnSpc>
+                <a:spcPct val="150000"/>
+              </a:lnSpc>
+            </a:pPr>
             <a:r>
               <a:rPr lang="en-US" dirty="0" smtClean="0"/>
               <a:t>Thread starting and replying</a:t>
             </a:r>
           </a:p>
           <a:p>
+            <a:pPr>
+              <a:lnSpc>
+                <a:spcPct val="150000"/>
+              </a:lnSpc>
+            </a:pPr>
             <a:r>
               <a:rPr lang="en-US" dirty="0"/>
               <a:t>G</a:t>
@@ -3991,27 +4135,44 @@
             </a:r>
           </a:p>
           <a:p>
-            <a:pPr lvl="1"/>
+            <a:pPr lvl="1">
+              <a:lnSpc>
+                <a:spcPct val="150000"/>
+              </a:lnSpc>
+            </a:pPr>
             <a:r>
               <a:rPr lang="en-US" dirty="0" smtClean="0"/>
               <a:t>Password mismatch error messages</a:t>
             </a:r>
           </a:p>
           <a:p>
-            <a:pPr lvl="1"/>
+            <a:pPr lvl="1">
+              <a:lnSpc>
+                <a:spcPct val="150000"/>
+              </a:lnSpc>
+            </a:pPr>
             <a:r>
               <a:rPr lang="en-US" dirty="0" smtClean="0"/>
               <a:t>Link to thread after replying</a:t>
             </a:r>
           </a:p>
           <a:p>
+            <a:pPr>
+              <a:lnSpc>
+                <a:spcPct val="150000"/>
+              </a:lnSpc>
+            </a:pPr>
             <a:r>
               <a:rPr lang="en-US" dirty="0" smtClean="0"/>
               <a:t>Easy to change password and email</a:t>
             </a:r>
           </a:p>
           <a:p>
-            <a:pPr lvl="1"/>
+            <a:pPr lvl="1">
+              <a:lnSpc>
+                <a:spcPct val="150000"/>
+              </a:lnSpc>
+            </a:pPr>
             <a:r>
               <a:rPr lang="en-US" dirty="0" smtClean="0"/>
               <a:t>Requires current password confirmation</a:t>
@@ -4165,7 +4326,7 @@
         <p:spPr/>
         <p:txBody>
           <a:bodyPr>
-            <a:normAutofit lnSpcReduction="10000"/>
+            <a:normAutofit fontScale="85000" lnSpcReduction="20000"/>
           </a:bodyPr>
           <a:lstStyle/>
           <a:p>
@@ -4178,8 +4339,15 @@
             <a:pPr lvl="1"/>
             <a:r>
               <a:rPr lang="en-US" dirty="0" smtClean="0"/>
-              <a:t>Reading online and talking to other coders to learn</a:t>
-            </a:r>
+              <a:t>Reading online and talking to other coders to </a:t>
+            </a:r>
+            <a:r>
+              <a:rPr lang="en-US" dirty="0" smtClean="0"/>
+              <a:t>learn</a:t>
+            </a:r>
+          </a:p>
+          <a:p>
+            <a:endParaRPr lang="en-US" dirty="0" smtClean="0"/>
           </a:p>
           <a:p>
             <a:r>
@@ -4195,9 +4363,16 @@
             </a:r>
           </a:p>
           <a:p>
-            <a:r>
-              <a:rPr lang="en-US" dirty="0" smtClean="0"/>
-              <a:t>Updating user info – code logic</a:t>
+            <a:endParaRPr lang="en-US" dirty="0" smtClean="0"/>
+          </a:p>
+          <a:p>
+            <a:r>
+              <a:rPr lang="en-US" dirty="0" smtClean="0"/>
+              <a:t>Updating </a:t>
+            </a:r>
+            <a:r>
+              <a:rPr lang="en-US" dirty="0" smtClean="0"/>
+              <a:t>user info – code logic</a:t>
             </a:r>
           </a:p>
           <a:p>
@@ -4208,9 +4383,16 @@
             </a:r>
           </a:p>
           <a:p>
-            <a:r>
-              <a:rPr lang="en-US" dirty="0" smtClean="0"/>
-              <a:t>Thread Ordering</a:t>
+            <a:endParaRPr lang="en-US" dirty="0" smtClean="0"/>
+          </a:p>
+          <a:p>
+            <a:r>
+              <a:rPr lang="en-US" dirty="0" smtClean="0"/>
+              <a:t>Thread </a:t>
+            </a:r>
+            <a:r>
+              <a:rPr lang="en-US" dirty="0" smtClean="0"/>
+              <a:t>Ordering</a:t>
             </a:r>
           </a:p>
           <a:p>
@@ -4221,9 +4403,16 @@
             </a:r>
           </a:p>
           <a:p>
-            <a:r>
-              <a:rPr lang="en-US" dirty="0" smtClean="0"/>
-              <a:t>Sticky Posts</a:t>
+            <a:endParaRPr lang="en-US" dirty="0" smtClean="0"/>
+          </a:p>
+          <a:p>
+            <a:r>
+              <a:rPr lang="en-US" dirty="0" smtClean="0"/>
+              <a:t>Sticky </a:t>
+            </a:r>
+            <a:r>
+              <a:rPr lang="en-US" dirty="0" smtClean="0"/>
+              <a:t>Posts</a:t>
             </a:r>
           </a:p>
           <a:p>
@@ -4310,18 +4499,75 @@
           <a:bodyPr/>
           <a:lstStyle/>
           <a:p>
+            <a:pPr>
+              <a:lnSpc>
+                <a:spcPct val="150000"/>
+              </a:lnSpc>
+            </a:pPr>
             <a:r>
               <a:rPr lang="en-US" dirty="0" smtClean="0"/>
               <a:t>Avatars</a:t>
             </a:r>
           </a:p>
           <a:p>
-            <a:r>
-              <a:rPr lang="en-US" dirty="0" smtClean="0"/>
-              <a:t>User choices for threads per page and thread ordering (newest first vs. oldest first)</a:t>
-            </a:r>
-          </a:p>
-          <a:p>
+            <a:pPr>
+              <a:lnSpc>
+                <a:spcPct val="150000"/>
+              </a:lnSpc>
+            </a:pPr>
+            <a:r>
+              <a:rPr lang="en-US" dirty="0" smtClean="0"/>
+              <a:t>User </a:t>
+            </a:r>
+            <a:r>
+              <a:rPr lang="en-US" dirty="0" smtClean="0"/>
+              <a:t>options</a:t>
+            </a:r>
+          </a:p>
+          <a:p>
+            <a:pPr lvl="1">
+              <a:lnSpc>
+                <a:spcPct val="150000"/>
+              </a:lnSpc>
+            </a:pPr>
+            <a:r>
+              <a:rPr lang="en-US" dirty="0" smtClean="0"/>
+              <a:t>Threads </a:t>
+            </a:r>
+            <a:r>
+              <a:rPr lang="en-US" dirty="0" smtClean="0"/>
+              <a:t>per </a:t>
+            </a:r>
+            <a:r>
+              <a:rPr lang="en-US" dirty="0" smtClean="0"/>
+              <a:t>page</a:t>
+            </a:r>
+          </a:p>
+          <a:p>
+            <a:pPr lvl="1">
+              <a:lnSpc>
+                <a:spcPct val="150000"/>
+              </a:lnSpc>
+            </a:pPr>
+            <a:r>
+              <a:rPr lang="en-US" dirty="0" smtClean="0"/>
+              <a:t>T</a:t>
+            </a:r>
+            <a:r>
+              <a:rPr lang="en-US" dirty="0" smtClean="0"/>
+              <a:t>hread </a:t>
+            </a:r>
+            <a:r>
+              <a:rPr lang="en-US" dirty="0" smtClean="0"/>
+              <a:t>ordering (newest first vs. oldest first)</a:t>
+            </a:r>
+          </a:p>
+          <a:p>
+            <a:pPr>
+              <a:lnSpc>
+                <a:spcPct val="150000"/>
+              </a:lnSpc>
+            </a:pPr>
             <a:r>
               <a:rPr lang="en-US" dirty="0" smtClean="0"/>
               <a:t>Editing and deleting own posts</a:t>
@@ -4329,12 +4575,22 @@
             <a:endParaRPr lang="en-US" dirty="0"/>
           </a:p>
           <a:p>
+            <a:pPr>
+              <a:lnSpc>
+                <a:spcPct val="150000"/>
+              </a:lnSpc>
+            </a:pPr>
             <a:r>
               <a:rPr lang="en-US" dirty="0" smtClean="0"/>
               <a:t>Administration system improvements</a:t>
             </a:r>
           </a:p>
           <a:p>
+            <a:pPr>
+              <a:lnSpc>
+                <a:spcPct val="150000"/>
+              </a:lnSpc>
+            </a:pPr>
             <a:r>
               <a:rPr lang="en-US" dirty="0" smtClean="0"/>
               <a:t>User forgot password</a:t>

</xml_diff>

<commit_message>
added another power point slide that was needed
</commit_message>
<xml_diff>
--- a/J2_Forum.pptx
+++ b/J2_Forum.pptx
@@ -10,10 +10,12 @@
     <p:sldId id="258" r:id="rId4"/>
     <p:sldId id="259" r:id="rId5"/>
     <p:sldId id="260" r:id="rId6"/>
-    <p:sldId id="266" r:id="rId7"/>
-    <p:sldId id="261" r:id="rId8"/>
-    <p:sldId id="263" r:id="rId9"/>
-    <p:sldId id="264" r:id="rId10"/>
+    <p:sldId id="268" r:id="rId7"/>
+    <p:sldId id="266" r:id="rId8"/>
+    <p:sldId id="261" r:id="rId9"/>
+    <p:sldId id="263" r:id="rId10"/>
+    <p:sldId id="267" r:id="rId11"/>
+    <p:sldId id="264" r:id="rId12"/>
   </p:sldIdLst>
   <p:sldSz cx="9144000" cy="6858000" type="screen4x3"/>
   <p:notesSz cx="6858000" cy="9144000"/>
@@ -3536,6 +3538,239 @@
 </p:sld>
 </file>
 
+<file path=ppt/slides/slide10.xml><?xml version="1.0" encoding="utf-8"?>
+<p:sld xmlns:a="http://schemas.openxmlformats.org/drawingml/2006/main" xmlns:r="http://schemas.openxmlformats.org/officeDocument/2006/relationships" xmlns:p="http://schemas.openxmlformats.org/presentationml/2006/main">
+  <p:cSld>
+    <p:spTree>
+      <p:nvGrpSpPr>
+        <p:cNvPr id="1" name=""/>
+        <p:cNvGrpSpPr/>
+        <p:nvPr/>
+      </p:nvGrpSpPr>
+      <p:grpSpPr>
+        <a:xfrm>
+          <a:off x="0" y="0"/>
+          <a:ext cx="0" cy="0"/>
+          <a:chOff x="0" y="0"/>
+          <a:chExt cx="0" cy="0"/>
+        </a:xfrm>
+      </p:grpSpPr>
+      <p:sp>
+        <p:nvSpPr>
+          <p:cNvPr id="2" name="Title 1"/>
+          <p:cNvSpPr>
+            <a:spLocks noGrp="1"/>
+          </p:cNvSpPr>
+          <p:nvPr>
+            <p:ph type="title"/>
+          </p:nvPr>
+        </p:nvSpPr>
+        <p:spPr/>
+        <p:txBody>
+          <a:bodyPr/>
+          <a:lstStyle/>
+          <a:p>
+            <a:r>
+              <a:rPr lang="en-US" dirty="0" smtClean="0"/>
+              <a:t>Fun Facts</a:t>
+            </a:r>
+            <a:endParaRPr lang="en-US" dirty="0"/>
+          </a:p>
+        </p:txBody>
+      </p:sp>
+      <p:sp>
+        <p:nvSpPr>
+          <p:cNvPr id="3" name="Content Placeholder 2"/>
+          <p:cNvSpPr>
+            <a:spLocks noGrp="1"/>
+          </p:cNvSpPr>
+          <p:nvPr>
+            <p:ph idx="1"/>
+          </p:nvPr>
+        </p:nvSpPr>
+        <p:spPr/>
+        <p:txBody>
+          <a:bodyPr/>
+          <a:lstStyle/>
+          <a:p>
+            <a:pPr>
+              <a:lnSpc>
+                <a:spcPct val="150000"/>
+              </a:lnSpc>
+            </a:pPr>
+            <a:r>
+              <a:rPr lang="en-US" dirty="0" smtClean="0"/>
+              <a:t>File count:  26 files</a:t>
+            </a:r>
+          </a:p>
+          <a:p>
+            <a:pPr>
+              <a:lnSpc>
+                <a:spcPct val="150000"/>
+              </a:lnSpc>
+            </a:pPr>
+            <a:r>
+              <a:rPr lang="en-US" dirty="0" smtClean="0"/>
+              <a:t>Lines of code:</a:t>
+            </a:r>
+            <a:endParaRPr lang="en-US" dirty="0" smtClean="0"/>
+          </a:p>
+          <a:p>
+            <a:pPr lvl="1"/>
+            <a:r>
+              <a:rPr lang="en-US" dirty="0" smtClean="0"/>
+              <a:t>Comment lines:  58</a:t>
+            </a:r>
+          </a:p>
+          <a:p>
+            <a:pPr lvl="1"/>
+            <a:r>
+              <a:rPr lang="en-US" dirty="0" smtClean="0"/>
+              <a:t>Blank lines:  184</a:t>
+            </a:r>
+          </a:p>
+          <a:p>
+            <a:pPr lvl="1"/>
+            <a:r>
+              <a:rPr lang="en-US" dirty="0" smtClean="0"/>
+              <a:t>CSS:  142</a:t>
+            </a:r>
+          </a:p>
+          <a:p>
+            <a:pPr lvl="1"/>
+            <a:r>
+              <a:rPr lang="en-US" dirty="0" smtClean="0"/>
+              <a:t>PHP:  1237</a:t>
+            </a:r>
+          </a:p>
+          <a:p>
+            <a:pPr lvl="1"/>
+            <a:r>
+              <a:rPr lang="en-US" dirty="0" smtClean="0"/>
+              <a:t>Total:  1621</a:t>
+            </a:r>
+          </a:p>
+          <a:p>
+            <a:pPr>
+              <a:lnSpc>
+                <a:spcPct val="150000"/>
+              </a:lnSpc>
+            </a:pPr>
+            <a:r>
+              <a:rPr lang="en-US" dirty="0" smtClean="0"/>
+              <a:t>Code revisions:  TBD</a:t>
+            </a:r>
+            <a:endParaRPr lang="en-US" dirty="0" smtClean="0"/>
+          </a:p>
+        </p:txBody>
+      </p:sp>
+    </p:spTree>
+  </p:cSld>
+  <p:clrMapOvr>
+    <a:masterClrMapping/>
+  </p:clrMapOvr>
+  <p:timing>
+    <p:tnLst>
+      <p:par>
+        <p:cTn id="1" dur="indefinite" restart="never" nodeType="tmRoot"/>
+      </p:par>
+    </p:tnLst>
+  </p:timing>
+</p:sld>
+</file>
+
+<file path=ppt/slides/slide11.xml><?xml version="1.0" encoding="utf-8"?>
+<p:sld xmlns:a="http://schemas.openxmlformats.org/drawingml/2006/main" xmlns:r="http://schemas.openxmlformats.org/officeDocument/2006/relationships" xmlns:p="http://schemas.openxmlformats.org/presentationml/2006/main">
+  <p:cSld>
+    <p:spTree>
+      <p:nvGrpSpPr>
+        <p:cNvPr id="1" name=""/>
+        <p:cNvGrpSpPr/>
+        <p:nvPr/>
+      </p:nvGrpSpPr>
+      <p:grpSpPr>
+        <a:xfrm>
+          <a:off x="0" y="0"/>
+          <a:ext cx="0" cy="0"/>
+          <a:chOff x="0" y="0"/>
+          <a:chExt cx="0" cy="0"/>
+        </a:xfrm>
+      </p:grpSpPr>
+      <p:sp>
+        <p:nvSpPr>
+          <p:cNvPr id="2" name="Title 1"/>
+          <p:cNvSpPr>
+            <a:spLocks noGrp="1"/>
+          </p:cNvSpPr>
+          <p:nvPr>
+            <p:ph type="title"/>
+          </p:nvPr>
+        </p:nvSpPr>
+        <p:spPr/>
+        <p:txBody>
+          <a:bodyPr/>
+          <a:lstStyle/>
+          <a:p>
+            <a:r>
+              <a:rPr lang="en-US" dirty="0" smtClean="0"/>
+              <a:t>Demonstration</a:t>
+            </a:r>
+            <a:endParaRPr lang="en-US" dirty="0"/>
+          </a:p>
+        </p:txBody>
+      </p:sp>
+      <p:sp>
+        <p:nvSpPr>
+          <p:cNvPr id="3" name="Content Placeholder 2"/>
+          <p:cNvSpPr>
+            <a:spLocks noGrp="1"/>
+          </p:cNvSpPr>
+          <p:nvPr>
+            <p:ph idx="1"/>
+          </p:nvPr>
+        </p:nvSpPr>
+        <p:spPr/>
+        <p:txBody>
+          <a:bodyPr/>
+          <a:lstStyle/>
+          <a:p>
+            <a:r>
+              <a:rPr lang="en-US" dirty="0" smtClean="0">
+                <a:hlinkClick r:id="rId2"/>
+              </a:rPr>
+              <a:t>Welcome to the J</a:t>
+            </a:r>
+            <a:r>
+              <a:rPr lang="en-US" baseline="30000" dirty="0" smtClean="0">
+                <a:hlinkClick r:id="rId2"/>
+              </a:rPr>
+              <a:t>2</a:t>
+            </a:r>
+            <a:r>
+              <a:rPr lang="en-US" dirty="0" smtClean="0">
+                <a:hlinkClick r:id="rId2"/>
+              </a:rPr>
+              <a:t> Forum!</a:t>
+            </a:r>
+            <a:endParaRPr lang="en-US" dirty="0"/>
+          </a:p>
+        </p:txBody>
+      </p:sp>
+    </p:spTree>
+  </p:cSld>
+  <p:clrMapOvr>
+    <a:masterClrMapping/>
+  </p:clrMapOvr>
+  <p:timing>
+    <p:tnLst>
+      <p:par>
+        <p:cTn id="1" dur="indefinite" restart="never" nodeType="tmRoot"/>
+      </p:par>
+    </p:tnLst>
+  </p:timing>
+</p:sld>
+</file>
+
 <file path=ppt/slides/slide2.xml><?xml version="1.0" encoding="utf-8"?>
 <p:sld xmlns:a="http://schemas.openxmlformats.org/drawingml/2006/main" xmlns:r="http://schemas.openxmlformats.org/officeDocument/2006/relationships" xmlns:p="http://schemas.openxmlformats.org/presentationml/2006/main">
   <p:cSld>
@@ -3588,7 +3823,9 @@
         </p:nvSpPr>
         <p:spPr/>
         <p:txBody>
-          <a:bodyPr/>
+          <a:bodyPr>
+            <a:normAutofit lnSpcReduction="10000"/>
+          </a:bodyPr>
           <a:lstStyle/>
           <a:p>
             <a:pPr>
@@ -3598,8 +3835,9 @@
             </a:pPr>
             <a:r>
               <a:rPr lang="en-US" dirty="0" smtClean="0"/>
-              <a:t>Why we chose the project</a:t>
-            </a:r>
+              <a:t>Project conception</a:t>
+            </a:r>
+            <a:endParaRPr lang="en-US" dirty="0" smtClean="0"/>
           </a:p>
           <a:p>
             <a:pPr>
@@ -3639,12 +3877,9 @@
             </a:pPr>
             <a:r>
               <a:rPr lang="en-US" dirty="0" smtClean="0"/>
-              <a:t>How </a:t>
-            </a:r>
-            <a:r>
-              <a:rPr lang="en-US" dirty="0" smtClean="0"/>
-              <a:t>we communicated during the design</a:t>
-            </a:r>
+              <a:t>Design communication</a:t>
+            </a:r>
+            <a:endParaRPr lang="en-US" dirty="0" smtClean="0"/>
           </a:p>
           <a:p>
             <a:pPr>
@@ -4230,7 +4465,7 @@
           <a:p>
             <a:r>
               <a:rPr lang="en-US" dirty="0" smtClean="0"/>
-              <a:t>Problems</a:t>
+              <a:t>Design Communication</a:t>
             </a:r>
             <a:endParaRPr lang="en-US" dirty="0"/>
           </a:p>
@@ -4253,8 +4488,68 @@
           <a:p>
             <a:r>
               <a:rPr lang="en-US" dirty="0" smtClean="0"/>
-              <a:t>Most problems solved by our group meetings, talking through the issues, and testing for bugs</a:t>
-            </a:r>
+              <a:t>Exclusive use of Google Code and Subversion (SVN)</a:t>
+            </a:r>
+          </a:p>
+          <a:p>
+            <a:pPr lvl="1">
+              <a:lnSpc>
+                <a:spcPct val="150000"/>
+              </a:lnSpc>
+            </a:pPr>
+            <a:r>
+              <a:rPr lang="en-US" dirty="0" smtClean="0"/>
+              <a:t>Multiple code revisions handled</a:t>
+            </a:r>
+          </a:p>
+          <a:p>
+            <a:pPr>
+              <a:lnSpc>
+                <a:spcPct val="150000"/>
+              </a:lnSpc>
+            </a:pPr>
+            <a:r>
+              <a:rPr lang="en-US" dirty="0" smtClean="0"/>
+              <a:t>Email and phone</a:t>
+            </a:r>
+          </a:p>
+          <a:p>
+            <a:pPr lvl="1">
+              <a:lnSpc>
+                <a:spcPct val="150000"/>
+              </a:lnSpc>
+            </a:pPr>
+            <a:r>
+              <a:rPr lang="en-US" dirty="0" smtClean="0"/>
+              <a:t>To discuss meeting times and answer questions</a:t>
+            </a:r>
+          </a:p>
+          <a:p>
+            <a:pPr>
+              <a:lnSpc>
+                <a:spcPct val="150000"/>
+              </a:lnSpc>
+            </a:pPr>
+            <a:r>
+              <a:rPr lang="en-US" dirty="0" smtClean="0"/>
+              <a:t>Team </a:t>
+            </a:r>
+            <a:r>
+              <a:rPr lang="en-US" dirty="0" smtClean="0"/>
+              <a:t>meetings</a:t>
+            </a:r>
+          </a:p>
+          <a:p>
+            <a:pPr lvl="1">
+              <a:lnSpc>
+                <a:spcPct val="150000"/>
+              </a:lnSpc>
+            </a:pPr>
+            <a:r>
+              <a:rPr lang="en-US" dirty="0" smtClean="0"/>
+              <a:t>Bulk of coding and design were handled</a:t>
+            </a:r>
+            <a:endParaRPr lang="en-US" dirty="0" smtClean="0"/>
           </a:p>
         </p:txBody>
       </p:sp>
@@ -4307,7 +4602,7 @@
           <a:p>
             <a:r>
               <a:rPr lang="en-US" dirty="0" smtClean="0"/>
-              <a:t>Problems and Solutions</a:t>
+              <a:t>Problems</a:t>
             </a:r>
             <a:endParaRPr lang="en-US" dirty="0"/>
           </a:p>
@@ -4325,105 +4620,13 @@
         </p:nvSpPr>
         <p:spPr/>
         <p:txBody>
-          <a:bodyPr>
-            <a:normAutofit fontScale="85000" lnSpcReduction="20000"/>
-          </a:bodyPr>
-          <a:lstStyle/>
-          <a:p>
-            <a:r>
-              <a:rPr lang="en-US" dirty="0" smtClean="0"/>
-              <a:t>Understanding POST and SESSION</a:t>
-            </a:r>
-          </a:p>
-          <a:p>
-            <a:pPr lvl="1"/>
-            <a:r>
-              <a:rPr lang="en-US" dirty="0" smtClean="0"/>
-              <a:t>Reading online and talking to other coders to </a:t>
-            </a:r>
-            <a:r>
-              <a:rPr lang="en-US" dirty="0" smtClean="0"/>
-              <a:t>learn</a:t>
-            </a:r>
-          </a:p>
-          <a:p>
-            <a:endParaRPr lang="en-US" dirty="0" smtClean="0"/>
-          </a:p>
-          <a:p>
-            <a:r>
-              <a:rPr lang="en-US" dirty="0" smtClean="0"/>
-              <a:t>Using Google Code and SVN</a:t>
-            </a:r>
-          </a:p>
-          <a:p>
-            <a:pPr lvl="1"/>
-            <a:r>
-              <a:rPr lang="en-US" dirty="0" smtClean="0"/>
-              <a:t>Jin had experience and explained how to use it</a:t>
-            </a:r>
-          </a:p>
-          <a:p>
-            <a:endParaRPr lang="en-US" dirty="0" smtClean="0"/>
-          </a:p>
-          <a:p>
-            <a:r>
-              <a:rPr lang="en-US" dirty="0" smtClean="0"/>
-              <a:t>Updating </a:t>
-            </a:r>
-            <a:r>
-              <a:rPr lang="en-US" dirty="0" smtClean="0"/>
-              <a:t>user info – code logic</a:t>
-            </a:r>
-          </a:p>
-          <a:p>
-            <a:pPr lvl="1"/>
-            <a:r>
-              <a:rPr lang="en-US" dirty="0" smtClean="0"/>
-              <a:t>Learned some by trial and error and some by looking up code syntax online</a:t>
-            </a:r>
-          </a:p>
-          <a:p>
-            <a:endParaRPr lang="en-US" dirty="0" smtClean="0"/>
-          </a:p>
-          <a:p>
-            <a:r>
-              <a:rPr lang="en-US" dirty="0" smtClean="0"/>
-              <a:t>Thread </a:t>
-            </a:r>
-            <a:r>
-              <a:rPr lang="en-US" dirty="0" smtClean="0"/>
-              <a:t>Ordering</a:t>
-            </a:r>
-          </a:p>
-          <a:p>
-            <a:pPr lvl="1"/>
-            <a:r>
-              <a:rPr lang="en-US" dirty="0" smtClean="0"/>
-              <a:t>Organized the logic of the code to help solve</a:t>
-            </a:r>
-          </a:p>
-          <a:p>
-            <a:endParaRPr lang="en-US" dirty="0" smtClean="0"/>
-          </a:p>
-          <a:p>
-            <a:r>
-              <a:rPr lang="en-US" dirty="0" smtClean="0"/>
-              <a:t>Sticky </a:t>
-            </a:r>
-            <a:r>
-              <a:rPr lang="en-US" dirty="0" smtClean="0"/>
-              <a:t>Posts</a:t>
-            </a:r>
-          </a:p>
-          <a:p>
-            <a:pPr lvl="1"/>
-            <a:r>
-              <a:rPr lang="en-US" dirty="0" smtClean="0"/>
-              <a:t>Checking database for sticky bit field and ordering the sticky posts at the top of all other threads</a:t>
-            </a:r>
-          </a:p>
-          <a:p>
-            <a:endParaRPr lang="en-US" dirty="0"/>
+          <a:bodyPr/>
+          <a:lstStyle/>
+          <a:p>
+            <a:r>
+              <a:rPr lang="en-US" dirty="0" smtClean="0"/>
+              <a:t>Most problems solved by our group meetings, talking through the issues, and testing for bugs</a:t>
+            </a:r>
           </a:p>
         </p:txBody>
       </p:sp>
@@ -4471,130 +4674,128 @@
         </p:nvSpPr>
         <p:spPr/>
         <p:txBody>
+          <a:bodyPr/>
+          <a:lstStyle/>
+          <a:p>
+            <a:r>
+              <a:rPr lang="en-US" dirty="0" smtClean="0"/>
+              <a:t>Problems and Solutions</a:t>
+            </a:r>
+            <a:endParaRPr lang="en-US" dirty="0"/>
+          </a:p>
+        </p:txBody>
+      </p:sp>
+      <p:sp>
+        <p:nvSpPr>
+          <p:cNvPr id="3" name="Content Placeholder 2"/>
+          <p:cNvSpPr>
+            <a:spLocks noGrp="1"/>
+          </p:cNvSpPr>
+          <p:nvPr>
+            <p:ph idx="1"/>
+          </p:nvPr>
+        </p:nvSpPr>
+        <p:spPr/>
+        <p:txBody>
           <a:bodyPr>
-            <a:normAutofit/>
+            <a:normAutofit fontScale="85000" lnSpcReduction="20000"/>
           </a:bodyPr>
           <a:lstStyle/>
           <a:p>
             <a:r>
               <a:rPr lang="en-US" dirty="0" smtClean="0"/>
-              <a:t>Future Expansion</a:t>
-            </a:r>
+              <a:t>Understanding POST and SESSION</a:t>
+            </a:r>
+          </a:p>
+          <a:p>
+            <a:pPr lvl="1"/>
+            <a:r>
+              <a:rPr lang="en-US" dirty="0" smtClean="0"/>
+              <a:t>Reading online and talking to other coders to </a:t>
+            </a:r>
+            <a:r>
+              <a:rPr lang="en-US" dirty="0" smtClean="0"/>
+              <a:t>learn</a:t>
+            </a:r>
+          </a:p>
+          <a:p>
+            <a:endParaRPr lang="en-US" dirty="0" smtClean="0"/>
+          </a:p>
+          <a:p>
+            <a:r>
+              <a:rPr lang="en-US" dirty="0" smtClean="0"/>
+              <a:t>Using Google Code and SVN</a:t>
+            </a:r>
+          </a:p>
+          <a:p>
+            <a:pPr lvl="1"/>
+            <a:r>
+              <a:rPr lang="en-US" dirty="0" smtClean="0"/>
+              <a:t>Jin had experience and explained how to use it</a:t>
+            </a:r>
+          </a:p>
+          <a:p>
+            <a:endParaRPr lang="en-US" dirty="0" smtClean="0"/>
+          </a:p>
+          <a:p>
+            <a:r>
+              <a:rPr lang="en-US" dirty="0" smtClean="0"/>
+              <a:t>Updating </a:t>
+            </a:r>
+            <a:r>
+              <a:rPr lang="en-US" dirty="0" smtClean="0"/>
+              <a:t>user info – code logic</a:t>
+            </a:r>
+          </a:p>
+          <a:p>
+            <a:pPr lvl="1"/>
+            <a:r>
+              <a:rPr lang="en-US" dirty="0" smtClean="0"/>
+              <a:t>Learned some by trial and error and some by looking up code syntax online</a:t>
+            </a:r>
+          </a:p>
+          <a:p>
+            <a:endParaRPr lang="en-US" dirty="0" smtClean="0"/>
+          </a:p>
+          <a:p>
+            <a:r>
+              <a:rPr lang="en-US" dirty="0" smtClean="0"/>
+              <a:t>Thread </a:t>
+            </a:r>
+            <a:r>
+              <a:rPr lang="en-US" dirty="0" smtClean="0"/>
+              <a:t>Ordering</a:t>
+            </a:r>
+          </a:p>
+          <a:p>
+            <a:pPr lvl="1"/>
+            <a:r>
+              <a:rPr lang="en-US" dirty="0" smtClean="0"/>
+              <a:t>Organized the logic of the code to help solve</a:t>
+            </a:r>
+          </a:p>
+          <a:p>
+            <a:endParaRPr lang="en-US" dirty="0" smtClean="0"/>
+          </a:p>
+          <a:p>
+            <a:r>
+              <a:rPr lang="en-US" dirty="0" smtClean="0"/>
+              <a:t>Sticky </a:t>
+            </a:r>
+            <a:r>
+              <a:rPr lang="en-US" dirty="0" smtClean="0"/>
+              <a:t>Posts</a:t>
+            </a:r>
+          </a:p>
+          <a:p>
+            <a:pPr lvl="1"/>
+            <a:r>
+              <a:rPr lang="en-US" dirty="0" smtClean="0"/>
+              <a:t>Checking database for sticky bit field and ordering the sticky posts at the top of all other threads</a:t>
+            </a:r>
+          </a:p>
+          <a:p>
             <a:endParaRPr lang="en-US" dirty="0"/>
-          </a:p>
-        </p:txBody>
-      </p:sp>
-      <p:sp>
-        <p:nvSpPr>
-          <p:cNvPr id="3" name="Content Placeholder 2"/>
-          <p:cNvSpPr>
-            <a:spLocks noGrp="1"/>
-          </p:cNvSpPr>
-          <p:nvPr>
-            <p:ph idx="1"/>
-          </p:nvPr>
-        </p:nvSpPr>
-        <p:spPr/>
-        <p:txBody>
-          <a:bodyPr/>
-          <a:lstStyle/>
-          <a:p>
-            <a:pPr>
-              <a:lnSpc>
-                <a:spcPct val="150000"/>
-              </a:lnSpc>
-            </a:pPr>
-            <a:r>
-              <a:rPr lang="en-US" dirty="0" smtClean="0"/>
-              <a:t>Avatars</a:t>
-            </a:r>
-          </a:p>
-          <a:p>
-            <a:pPr>
-              <a:lnSpc>
-                <a:spcPct val="150000"/>
-              </a:lnSpc>
-            </a:pPr>
-            <a:r>
-              <a:rPr lang="en-US" dirty="0" smtClean="0"/>
-              <a:t>User </a:t>
-            </a:r>
-            <a:r>
-              <a:rPr lang="en-US" dirty="0" smtClean="0"/>
-              <a:t>options</a:t>
-            </a:r>
-          </a:p>
-          <a:p>
-            <a:pPr lvl="1">
-              <a:lnSpc>
-                <a:spcPct val="150000"/>
-              </a:lnSpc>
-            </a:pPr>
-            <a:r>
-              <a:rPr lang="en-US" dirty="0" smtClean="0"/>
-              <a:t>Threads </a:t>
-            </a:r>
-            <a:r>
-              <a:rPr lang="en-US" dirty="0" smtClean="0"/>
-              <a:t>per </a:t>
-            </a:r>
-            <a:r>
-              <a:rPr lang="en-US" dirty="0" smtClean="0"/>
-              <a:t>page</a:t>
-            </a:r>
-          </a:p>
-          <a:p>
-            <a:pPr lvl="1">
-              <a:lnSpc>
-                <a:spcPct val="150000"/>
-              </a:lnSpc>
-            </a:pPr>
-            <a:r>
-              <a:rPr lang="en-US" dirty="0" smtClean="0"/>
-              <a:t>T</a:t>
-            </a:r>
-            <a:r>
-              <a:rPr lang="en-US" dirty="0" smtClean="0"/>
-              <a:t>hread </a:t>
-            </a:r>
-            <a:r>
-              <a:rPr lang="en-US" dirty="0" smtClean="0"/>
-              <a:t>ordering (newest first vs. oldest first)</a:t>
-            </a:r>
-          </a:p>
-          <a:p>
-            <a:pPr>
-              <a:lnSpc>
-                <a:spcPct val="150000"/>
-              </a:lnSpc>
-            </a:pPr>
-            <a:r>
-              <a:rPr lang="en-US" dirty="0" smtClean="0"/>
-              <a:t>Editing and deleting own posts</a:t>
-            </a:r>
-            <a:endParaRPr lang="en-US" dirty="0"/>
-          </a:p>
-          <a:p>
-            <a:pPr>
-              <a:lnSpc>
-                <a:spcPct val="150000"/>
-              </a:lnSpc>
-            </a:pPr>
-            <a:r>
-              <a:rPr lang="en-US" dirty="0" smtClean="0"/>
-              <a:t>Administration system improvements</a:t>
-            </a:r>
-          </a:p>
-          <a:p>
-            <a:pPr>
-              <a:lnSpc>
-                <a:spcPct val="150000"/>
-              </a:lnSpc>
-            </a:pPr>
-            <a:r>
-              <a:rPr lang="en-US" dirty="0" smtClean="0"/>
-              <a:t>User forgot password</a:t>
-            </a:r>
           </a:p>
         </p:txBody>
       </p:sp>
@@ -4642,12 +4843,14 @@
         </p:nvSpPr>
         <p:spPr/>
         <p:txBody>
-          <a:bodyPr/>
-          <a:lstStyle/>
-          <a:p>
-            <a:r>
-              <a:rPr lang="en-US" dirty="0" smtClean="0"/>
-              <a:t>Demonstration</a:t>
+          <a:bodyPr>
+            <a:normAutofit/>
+          </a:bodyPr>
+          <a:lstStyle/>
+          <a:p>
+            <a:r>
+              <a:rPr lang="en-US" dirty="0" smtClean="0"/>
+              <a:t>Future Expansion</a:t>
             </a:r>
             <a:endParaRPr lang="en-US" dirty="0"/>
           </a:p>
@@ -4668,13 +4871,102 @@
           <a:bodyPr/>
           <a:lstStyle/>
           <a:p>
-            <a:r>
-              <a:rPr lang="en-US" dirty="0" smtClean="0">
-                <a:hlinkClick r:id="rId2"/>
-              </a:rPr>
-              <a:t>Welcome to the J2 Forum!</a:t>
+            <a:pPr>
+              <a:lnSpc>
+                <a:spcPct val="150000"/>
+              </a:lnSpc>
+            </a:pPr>
+            <a:r>
+              <a:rPr lang="en-US" dirty="0" smtClean="0"/>
+              <a:t>Avatars</a:t>
+            </a:r>
+          </a:p>
+          <a:p>
+            <a:pPr>
+              <a:lnSpc>
+                <a:spcPct val="150000"/>
+              </a:lnSpc>
+            </a:pPr>
+            <a:r>
+              <a:rPr lang="en-US" dirty="0" smtClean="0"/>
+              <a:t>User </a:t>
+            </a:r>
+            <a:r>
+              <a:rPr lang="en-US" dirty="0" smtClean="0"/>
+              <a:t>options</a:t>
+            </a:r>
+          </a:p>
+          <a:p>
+            <a:pPr lvl="1">
+              <a:lnSpc>
+                <a:spcPct val="150000"/>
+              </a:lnSpc>
+            </a:pPr>
+            <a:r>
+              <a:rPr lang="en-US" dirty="0" smtClean="0"/>
+              <a:t>Threads </a:t>
+            </a:r>
+            <a:r>
+              <a:rPr lang="en-US" dirty="0" smtClean="0"/>
+              <a:t>per </a:t>
+            </a:r>
+            <a:r>
+              <a:rPr lang="en-US" dirty="0" smtClean="0"/>
+              <a:t>page</a:t>
+            </a:r>
+          </a:p>
+          <a:p>
+            <a:pPr lvl="1">
+              <a:lnSpc>
+                <a:spcPct val="150000"/>
+              </a:lnSpc>
+            </a:pPr>
+            <a:r>
+              <a:rPr lang="en-US" dirty="0" smtClean="0"/>
+              <a:t>T</a:t>
+            </a:r>
+            <a:r>
+              <a:rPr lang="en-US" dirty="0" smtClean="0"/>
+              <a:t>hread </a:t>
+            </a:r>
+            <a:r>
+              <a:rPr lang="en-US" dirty="0" smtClean="0"/>
+              <a:t>ordering (newest first vs. oldest first)</a:t>
+            </a:r>
+          </a:p>
+          <a:p>
+            <a:pPr>
+              <a:lnSpc>
+                <a:spcPct val="150000"/>
+              </a:lnSpc>
+            </a:pPr>
+            <a:r>
+              <a:rPr lang="en-US" dirty="0" smtClean="0"/>
+              <a:t>Editing and deleting own posts</a:t>
             </a:r>
             <a:endParaRPr lang="en-US" dirty="0"/>
+          </a:p>
+          <a:p>
+            <a:pPr>
+              <a:lnSpc>
+                <a:spcPct val="150000"/>
+              </a:lnSpc>
+            </a:pPr>
+            <a:r>
+              <a:rPr lang="en-US" dirty="0" smtClean="0"/>
+              <a:t>Administration system improvements</a:t>
+            </a:r>
+          </a:p>
+          <a:p>
+            <a:pPr>
+              <a:lnSpc>
+                <a:spcPct val="150000"/>
+              </a:lnSpc>
+            </a:pPr>
+            <a:r>
+              <a:rPr lang="en-US" dirty="0" smtClean="0"/>
+              <a:t>User forgot password</a:t>
+            </a:r>
           </a:p>
         </p:txBody>
       </p:sp>

</xml_diff>

<commit_message>
double header fixed in change password error page
</commit_message>
<xml_diff>
--- a/J2_Forum.pptx
+++ b/J2_Forum.pptx
@@ -288,7 +288,7 @@
             <a:fld id="{65147187-FD92-4E97-8F7C-BDE6B023CBF3}" type="datetimeFigureOut">
               <a:rPr lang="en-US" smtClean="0"/>
               <a:pPr/>
-              <a:t>4/21/2011</a:t>
+              <a:t>4/25/2011</a:t>
             </a:fld>
             <a:endParaRPr lang="en-US"/>
           </a:p>
@@ -463,7 +463,7 @@
             <a:fld id="{65147187-FD92-4E97-8F7C-BDE6B023CBF3}" type="datetimeFigureOut">
               <a:rPr lang="en-US" smtClean="0"/>
               <a:pPr/>
-              <a:t>4/21/2011</a:t>
+              <a:t>4/25/2011</a:t>
             </a:fld>
             <a:endParaRPr lang="en-US"/>
           </a:p>
@@ -640,7 +640,7 @@
             <a:fld id="{65147187-FD92-4E97-8F7C-BDE6B023CBF3}" type="datetimeFigureOut">
               <a:rPr lang="en-US" smtClean="0"/>
               <a:pPr/>
-              <a:t>4/21/2011</a:t>
+              <a:t>4/25/2011</a:t>
             </a:fld>
             <a:endParaRPr lang="en-US"/>
           </a:p>
@@ -807,7 +807,7 @@
             <a:fld id="{65147187-FD92-4E97-8F7C-BDE6B023CBF3}" type="datetimeFigureOut">
               <a:rPr lang="en-US" smtClean="0"/>
               <a:pPr/>
-              <a:t>4/21/2011</a:t>
+              <a:t>4/25/2011</a:t>
             </a:fld>
             <a:endParaRPr lang="en-US"/>
           </a:p>
@@ -1174,7 +1174,7 @@
             <a:fld id="{65147187-FD92-4E97-8F7C-BDE6B023CBF3}" type="datetimeFigureOut">
               <a:rPr lang="en-US" smtClean="0"/>
               <a:pPr/>
-              <a:t>4/21/2011</a:t>
+              <a:t>4/25/2011</a:t>
             </a:fld>
             <a:endParaRPr lang="en-US"/>
           </a:p>
@@ -1469,7 +1469,7 @@
             <a:fld id="{65147187-FD92-4E97-8F7C-BDE6B023CBF3}" type="datetimeFigureOut">
               <a:rPr lang="en-US" smtClean="0"/>
               <a:pPr/>
-              <a:t>4/21/2011</a:t>
+              <a:t>4/25/2011</a:t>
             </a:fld>
             <a:endParaRPr lang="en-US"/>
           </a:p>
@@ -1937,7 +1937,7 @@
             <a:fld id="{65147187-FD92-4E97-8F7C-BDE6B023CBF3}" type="datetimeFigureOut">
               <a:rPr lang="en-US" smtClean="0"/>
               <a:pPr/>
-              <a:t>4/21/2011</a:t>
+              <a:t>4/25/2011</a:t>
             </a:fld>
             <a:endParaRPr lang="en-US"/>
           </a:p>
@@ -2061,7 +2061,7 @@
             <a:fld id="{65147187-FD92-4E97-8F7C-BDE6B023CBF3}" type="datetimeFigureOut">
               <a:rPr lang="en-US" smtClean="0"/>
               <a:pPr/>
-              <a:t>4/21/2011</a:t>
+              <a:t>4/25/2011</a:t>
             </a:fld>
             <a:endParaRPr lang="en-US"/>
           </a:p>
@@ -2153,7 +2153,7 @@
             <a:fld id="{65147187-FD92-4E97-8F7C-BDE6B023CBF3}" type="datetimeFigureOut">
               <a:rPr lang="en-US" smtClean="0"/>
               <a:pPr/>
-              <a:t>4/21/2011</a:t>
+              <a:t>4/25/2011</a:t>
             </a:fld>
             <a:endParaRPr lang="en-US"/>
           </a:p>
@@ -2445,7 +2445,7 @@
             <a:fld id="{65147187-FD92-4E97-8F7C-BDE6B023CBF3}" type="datetimeFigureOut">
               <a:rPr lang="en-US" smtClean="0"/>
               <a:pPr/>
-              <a:t>4/21/2011</a:t>
+              <a:t>4/25/2011</a:t>
             </a:fld>
             <a:endParaRPr lang="en-US"/>
           </a:p>
@@ -2793,7 +2793,7 @@
             <a:fld id="{65147187-FD92-4E97-8F7C-BDE6B023CBF3}" type="datetimeFigureOut">
               <a:rPr lang="en-US" smtClean="0"/>
               <a:pPr/>
-              <a:t>4/21/2011</a:t>
+              <a:t>4/25/2011</a:t>
             </a:fld>
             <a:endParaRPr lang="en-US"/>
           </a:p>
@@ -3133,7 +3133,7 @@
             <a:fld id="{65147187-FD92-4E97-8F7C-BDE6B023CBF3}" type="datetimeFigureOut">
               <a:rPr lang="en-US" smtClean="0"/>
               <a:pPr/>
-              <a:t>4/21/2011</a:t>
+              <a:t>4/25/2011</a:t>
             </a:fld>
             <a:endParaRPr lang="en-US"/>
           </a:p>
@@ -3600,15 +3600,7 @@
             </a:pPr>
             <a:r>
               <a:rPr lang="en-US" dirty="0" smtClean="0"/>
-              <a:t>File count:  </a:t>
-            </a:r>
-            <a:r>
-              <a:rPr lang="en-US" dirty="0" smtClean="0"/>
-              <a:t>27 </a:t>
-            </a:r>
-            <a:r>
-              <a:rPr lang="en-US" dirty="0" smtClean="0"/>
-              <a:t>files</a:t>
+              <a:t>File count:  27 files</a:t>
             </a:r>
           </a:p>
           <a:p>
@@ -3630,7 +3622,7 @@
             </a:r>
             <a:r>
               <a:rPr lang="en-US" dirty="0" smtClean="0"/>
-              <a:t>60</a:t>
+              <a:t>87</a:t>
             </a:r>
             <a:endParaRPr lang="en-US" dirty="0" smtClean="0"/>
           </a:p>
@@ -3638,8 +3630,13 @@
             <a:pPr lvl="1"/>
             <a:r>
               <a:rPr lang="en-US" dirty="0" smtClean="0"/>
-              <a:t>Blank lines:  184</a:t>
-            </a:r>
+              <a:t>Blank lines:  </a:t>
+            </a:r>
+            <a:r>
+              <a:rPr lang="en-US" dirty="0" smtClean="0"/>
+              <a:t>185</a:t>
+            </a:r>
+            <a:endParaRPr lang="en-US" dirty="0" smtClean="0"/>
           </a:p>
           <a:p>
             <a:pPr lvl="1"/>
@@ -3649,7 +3646,7 @@
             </a:r>
             <a:r>
               <a:rPr lang="en-US" dirty="0" smtClean="0"/>
-              <a:t>146</a:t>
+              <a:t>147</a:t>
             </a:r>
             <a:endParaRPr lang="en-US" dirty="0" smtClean="0"/>
           </a:p>
@@ -3661,7 +3658,7 @@
             </a:r>
             <a:r>
               <a:rPr lang="en-US" dirty="0" smtClean="0"/>
-              <a:t>1255</a:t>
+              <a:t>1248</a:t>
             </a:r>
             <a:endParaRPr lang="en-US" dirty="0" smtClean="0"/>
           </a:p>
@@ -3673,7 +3670,7 @@
             </a:r>
             <a:r>
               <a:rPr lang="en-US" dirty="0" smtClean="0"/>
-              <a:t>1645</a:t>
+              <a:t>1667</a:t>
             </a:r>
             <a:endParaRPr lang="en-US" dirty="0" smtClean="0"/>
           </a:p>

</xml_diff>